<commit_message>
Adding slides and code for London QCon 2012 talk
</commit_message>
<xml_diff>
--- a/Talks 2011/Async C# and F# (Belfast)/slides.pptx
+++ b/Talks 2011/Async C# and F# (Belfast)/slides.pptx
@@ -2700,13 +2700,13 @@
     </dgm:pt>
   </dgm:ptLst>
   <dgm:cxnLst>
+    <dgm:cxn modelId="{FFFA80E2-BD4A-49D8-A0F5-9AE35F38972A}" srcId="{282B60CE-6BD1-44E4-8F00-1C817E897139}" destId="{99E4BD35-90AA-4A2E-A879-65FBDD28A1C9}" srcOrd="0" destOrd="0" parTransId="{5C423689-189A-40E4-92D2-D5295101C6C5}" sibTransId="{31235AE3-84D6-4431-8683-AC313326260E}"/>
+    <dgm:cxn modelId="{D2FC07A0-D738-4B88-A726-3F46370BF0A7}" type="presOf" srcId="{EA25A1E5-11B9-43BA-A22F-150F61FC4B94}" destId="{4D46E73C-B49D-4636-AA09-153E9704CEDB}" srcOrd="0" destOrd="0" presId="urn:microsoft.com/office/officeart/2005/8/layout/hProcess9"/>
+    <dgm:cxn modelId="{C1A6809D-769E-4850-8D0F-6905A632D149}" srcId="{282B60CE-6BD1-44E4-8F00-1C817E897139}" destId="{4E217D51-00A4-41DC-B067-1F0AA1C19398}" srcOrd="1" destOrd="0" parTransId="{9EC30335-EF4D-4291-A608-D7F2E38034C6}" sibTransId="{13D4DA9D-22F4-4B40-ACF4-D3986FB2BD07}"/>
+    <dgm:cxn modelId="{7F19A3F7-4B0E-43DB-98EA-12A6F352BE8A}" type="presOf" srcId="{282B60CE-6BD1-44E4-8F00-1C817E897139}" destId="{A178B05F-5E3C-492E-B66A-6B51DC6AE1F8}" srcOrd="0" destOrd="0" presId="urn:microsoft.com/office/officeart/2005/8/layout/hProcess9"/>
     <dgm:cxn modelId="{622042CA-24B5-40E8-93C7-0452CC6EFF0B}" srcId="{282B60CE-6BD1-44E4-8F00-1C817E897139}" destId="{EA25A1E5-11B9-43BA-A22F-150F61FC4B94}" srcOrd="2" destOrd="0" parTransId="{03D44CEC-76BE-44E3-8D2F-ACC20D0DB5FB}" sibTransId="{5A7A7FF8-D9A0-443D-8941-593B05F6C935}"/>
-    <dgm:cxn modelId="{FFFA80E2-BD4A-49D8-A0F5-9AE35F38972A}" srcId="{282B60CE-6BD1-44E4-8F00-1C817E897139}" destId="{99E4BD35-90AA-4A2E-A879-65FBDD28A1C9}" srcOrd="0" destOrd="0" parTransId="{5C423689-189A-40E4-92D2-D5295101C6C5}" sibTransId="{31235AE3-84D6-4431-8683-AC313326260E}"/>
-    <dgm:cxn modelId="{7F19A3F7-4B0E-43DB-98EA-12A6F352BE8A}" type="presOf" srcId="{282B60CE-6BD1-44E4-8F00-1C817E897139}" destId="{A178B05F-5E3C-492E-B66A-6B51DC6AE1F8}" srcOrd="0" destOrd="0" presId="urn:microsoft.com/office/officeart/2005/8/layout/hProcess9"/>
-    <dgm:cxn modelId="{D2FC07A0-D738-4B88-A726-3F46370BF0A7}" type="presOf" srcId="{EA25A1E5-11B9-43BA-A22F-150F61FC4B94}" destId="{4D46E73C-B49D-4636-AA09-153E9704CEDB}" srcOrd="0" destOrd="0" presId="urn:microsoft.com/office/officeart/2005/8/layout/hProcess9"/>
     <dgm:cxn modelId="{D8F4DB42-899A-4DD2-94F0-8E89AB81E57D}" type="presOf" srcId="{99E4BD35-90AA-4A2E-A879-65FBDD28A1C9}" destId="{8E8AC173-C9FA-4ED9-AF29-25DD21EB30DD}" srcOrd="0" destOrd="0" presId="urn:microsoft.com/office/officeart/2005/8/layout/hProcess9"/>
     <dgm:cxn modelId="{550A3CAE-75D7-4BD9-8415-C7CC9F373306}" type="presOf" srcId="{4E217D51-00A4-41DC-B067-1F0AA1C19398}" destId="{664FB495-83CD-4C83-9A52-68C85080A72F}" srcOrd="0" destOrd="0" presId="urn:microsoft.com/office/officeart/2005/8/layout/hProcess9"/>
-    <dgm:cxn modelId="{C1A6809D-769E-4850-8D0F-6905A632D149}" srcId="{282B60CE-6BD1-44E4-8F00-1C817E897139}" destId="{4E217D51-00A4-41DC-B067-1F0AA1C19398}" srcOrd="1" destOrd="0" parTransId="{9EC30335-EF4D-4291-A608-D7F2E38034C6}" sibTransId="{13D4DA9D-22F4-4B40-ACF4-D3986FB2BD07}"/>
     <dgm:cxn modelId="{F816B537-200A-4113-BC23-B5FD567C974A}" type="presParOf" srcId="{A178B05F-5E3C-492E-B66A-6B51DC6AE1F8}" destId="{674248D7-22F4-42A4-85D9-DF439431AD77}" srcOrd="0" destOrd="0" presId="urn:microsoft.com/office/officeart/2005/8/layout/hProcess9"/>
     <dgm:cxn modelId="{44D8ABA1-081F-4873-9B3D-EA7B8DC24247}" type="presParOf" srcId="{A178B05F-5E3C-492E-B66A-6B51DC6AE1F8}" destId="{F39248ED-778C-4807-91B2-CFD3AF62C0D1}" srcOrd="1" destOrd="0" presId="urn:microsoft.com/office/officeart/2005/8/layout/hProcess9"/>
     <dgm:cxn modelId="{7466A44B-8001-4708-9515-D2A68C01EDB2}" type="presParOf" srcId="{F39248ED-778C-4807-91B2-CFD3AF62C0D1}" destId="{8E8AC173-C9FA-4ED9-AF29-25DD21EB30DD}" srcOrd="0" destOrd="0" presId="urn:microsoft.com/office/officeart/2005/8/layout/hProcess9"/>
@@ -7709,7 +7709,7 @@
           <a:p>
             <a:fld id="{D5FC6885-51AA-488E-9655-D43E36650D17}" type="datetimeFigureOut">
               <a:rPr lang="cs-CZ" smtClean="0"/>
-              <a:t>28.9.2011</a:t>
+              <a:t>8.12.2011</a:t>
             </a:fld>
             <a:endParaRPr lang="cs-CZ"/>
           </a:p>
@@ -8536,7 +8536,7 @@
           <a:p>
             <a:fld id="{6FC8D5CC-2F9C-0A43-BA5F-4305E198EAE7}" type="datetimeFigureOut">
               <a:rPr lang="en-US" smtClean="0"/>
-              <a:t>9/28/2011</a:t>
+              <a:t>12/8/2011</a:t>
             </a:fld>
             <a:endParaRPr lang="en-US"/>
           </a:p>
@@ -8880,7 +8880,7 @@
           <a:p>
             <a:fld id="{6FC8D5CC-2F9C-0A43-BA5F-4305E198EAE7}" type="datetimeFigureOut">
               <a:rPr lang="en-US" smtClean="0"/>
-              <a:t>9/28/2011</a:t>
+              <a:t>12/8/2011</a:t>
             </a:fld>
             <a:endParaRPr lang="en-US"/>
           </a:p>
@@ -9201,7 +9201,7 @@
           <a:p>
             <a:fld id="{6FC8D5CC-2F9C-0A43-BA5F-4305E198EAE7}" type="datetimeFigureOut">
               <a:rPr lang="en-US" smtClean="0"/>
-              <a:t>9/28/2011</a:t>
+              <a:t>12/8/2011</a:t>
             </a:fld>
             <a:endParaRPr lang="en-US"/>
           </a:p>
@@ -9478,7 +9478,7 @@
           <a:p>
             <a:fld id="{6FC8D5CC-2F9C-0A43-BA5F-4305E198EAE7}" type="datetimeFigureOut">
               <a:rPr lang="en-US" smtClean="0"/>
-              <a:t>9/28/2011</a:t>
+              <a:t>12/8/2011</a:t>
             </a:fld>
             <a:endParaRPr lang="en-US"/>
           </a:p>
@@ -9772,7 +9772,7 @@
           <a:p>
             <a:fld id="{6FC8D5CC-2F9C-0A43-BA5F-4305E198EAE7}" type="datetimeFigureOut">
               <a:rPr lang="en-US" smtClean="0"/>
-              <a:t>9/28/2011</a:t>
+              <a:t>12/8/2011</a:t>
             </a:fld>
             <a:endParaRPr lang="en-US"/>
           </a:p>
@@ -10101,7 +10101,7 @@
           <a:p>
             <a:fld id="{6FC8D5CC-2F9C-0A43-BA5F-4305E198EAE7}" type="datetimeFigureOut">
               <a:rPr lang="en-US" smtClean="0"/>
-              <a:t>9/28/2011</a:t>
+              <a:t>12/8/2011</a:t>
             </a:fld>
             <a:endParaRPr lang="en-US"/>
           </a:p>
@@ -10352,7 +10352,7 @@
           <a:p>
             <a:fld id="{6FC8D5CC-2F9C-0A43-BA5F-4305E198EAE7}" type="datetimeFigureOut">
               <a:rPr lang="en-US" smtClean="0"/>
-              <a:t>9/28/2011</a:t>
+              <a:t>12/8/2011</a:t>
             </a:fld>
             <a:endParaRPr lang="en-US"/>
           </a:p>
@@ -10531,7 +10531,7 @@
           <a:p>
             <a:fld id="{6FC8D5CC-2F9C-0A43-BA5F-4305E198EAE7}" type="datetimeFigureOut">
               <a:rPr lang="en-US" smtClean="0"/>
-              <a:t>9/28/2011</a:t>
+              <a:t>12/8/2011</a:t>
             </a:fld>
             <a:endParaRPr lang="en-US"/>
           </a:p>
@@ -10700,7 +10700,7 @@
           <a:p>
             <a:fld id="{6FC8D5CC-2F9C-0A43-BA5F-4305E198EAE7}" type="datetimeFigureOut">
               <a:rPr lang="en-US" smtClean="0"/>
-              <a:t>9/28/2011</a:t>
+              <a:t>12/8/2011</a:t>
             </a:fld>
             <a:endParaRPr lang="en-US"/>
           </a:p>
@@ -10860,7 +10860,7 @@
           <a:p>
             <a:fld id="{6FC8D5CC-2F9C-0A43-BA5F-4305E198EAE7}" type="datetimeFigureOut">
               <a:rPr lang="en-US" smtClean="0"/>
-              <a:t>9/28/2011</a:t>
+              <a:t>12/8/2011</a:t>
             </a:fld>
             <a:endParaRPr lang="en-US"/>
           </a:p>
@@ -11141,7 +11141,7 @@
           <a:p>
             <a:fld id="{6FC8D5CC-2F9C-0A43-BA5F-4305E198EAE7}" type="datetimeFigureOut">
               <a:rPr lang="en-US" smtClean="0"/>
-              <a:t>9/28/2011</a:t>
+              <a:t>12/8/2011</a:t>
             </a:fld>
             <a:endParaRPr lang="en-US"/>
           </a:p>
@@ -11455,7 +11455,7 @@
           <a:p>
             <a:fld id="{6FC8D5CC-2F9C-0A43-BA5F-4305E198EAE7}" type="datetimeFigureOut">
               <a:rPr lang="en-US" smtClean="0"/>
-              <a:t>9/28/2011</a:t>
+              <a:t>12/8/2011</a:t>
             </a:fld>
             <a:endParaRPr lang="en-US"/>
           </a:p>
@@ -12302,7 +12302,7 @@
           <a:p>
             <a:fld id="{6FC8D5CC-2F9C-0A43-BA5F-4305E198EAE7}" type="datetimeFigureOut">
               <a:rPr lang="en-US" smtClean="0"/>
-              <a:t>9/28/2011</a:t>
+              <a:t>12/8/2011</a:t>
             </a:fld>
             <a:endParaRPr lang="en-US"/>
           </a:p>
@@ -12739,7 +12739,7 @@
           <a:p>
             <a:fld id="{6FC8D5CC-2F9C-0A43-BA5F-4305E198EAE7}" type="datetimeFigureOut">
               <a:rPr lang="en-US" smtClean="0"/>
-              <a:t>9/28/2011</a:t>
+              <a:t>12/8/2011</a:t>
             </a:fld>
             <a:endParaRPr lang="en-US"/>
           </a:p>
@@ -13085,7 +13085,7 @@
           <a:p>
             <a:fld id="{6FC8D5CC-2F9C-0A43-BA5F-4305E198EAE7}" type="datetimeFigureOut">
               <a:rPr lang="en-US" smtClean="0"/>
-              <a:t>9/28/2011</a:t>
+              <a:t>12/8/2011</a:t>
             </a:fld>
             <a:endParaRPr lang="en-US"/>
           </a:p>
@@ -13175,7 +13175,7 @@
           <a:p>
             <a:fld id="{6FC8D5CC-2F9C-0A43-BA5F-4305E198EAE7}" type="datetimeFigureOut">
               <a:rPr lang="en-US" smtClean="0"/>
-              <a:t>9/28/2011</a:t>
+              <a:t>12/8/2011</a:t>
             </a:fld>
             <a:endParaRPr lang="en-US"/>
           </a:p>
@@ -13387,7 +13387,7 @@
           <a:p>
             <a:fld id="{6FC8D5CC-2F9C-0A43-BA5F-4305E198EAE7}" type="datetimeFigureOut">
               <a:rPr lang="en-US" smtClean="0"/>
-              <a:t>9/28/2011</a:t>
+              <a:t>12/8/2011</a:t>
             </a:fld>
             <a:endParaRPr lang="en-US"/>
           </a:p>
@@ -13955,7 +13955,6 @@
               <a:rPr lang="en-US" sz="3000" dirty="0"/>
               <a:t>Asynchronous programming with F# and C#</a:t>
             </a:r>
-            <a:endParaRPr lang="en-US" sz="3000" dirty="0"/>
           </a:p>
         </p:txBody>
       </p:sp>
@@ -14048,14 +14047,7 @@
                 <a:latin typeface="Calibri" pitchFamily="34" charset="0"/>
                 <a:cs typeface="Calibri" pitchFamily="34" charset="0"/>
               </a:rPr>
-              <a:t>      </a:t>
-            </a:r>
-            <a:r>
-              <a:rPr lang="en-US" sz="3000" b="1" dirty="0" smtClean="0">
-                <a:latin typeface="Calibri" pitchFamily="34" charset="0"/>
-                <a:cs typeface="Calibri" pitchFamily="34" charset="0"/>
-              </a:rPr>
-              <a:t>   </a:t>
+              <a:t>         </a:t>
             </a:r>
             <a:r>
               <a:rPr lang="en-US" sz="3000" dirty="0" smtClean="0">
@@ -14064,10 +14056,6 @@
               </a:rPr>
               <a:t>Microsoft MVP</a:t>
             </a:r>
-            <a:endParaRPr lang="en-US" sz="3000" dirty="0" smtClean="0">
-              <a:latin typeface="Calibri" pitchFamily="34" charset="0"/>
-              <a:cs typeface="Calibri" pitchFamily="34" charset="0"/>
-            </a:endParaRPr>
           </a:p>
           <a:p>
             <a:r>
@@ -14099,14 +14087,7 @@
                 <a:latin typeface="Calibri" pitchFamily="34" charset="0"/>
                 <a:cs typeface="Calibri" pitchFamily="34" charset="0"/>
               </a:rPr>
-              <a:t>  </a:t>
-            </a:r>
-            <a:r>
-              <a:rPr lang="en-US" sz="2600" dirty="0" smtClean="0">
-                <a:latin typeface="Calibri" pitchFamily="34" charset="0"/>
-                <a:cs typeface="Calibri" pitchFamily="34" charset="0"/>
-              </a:rPr>
-              <a:t>| </a:t>
+              <a:t>  | </a:t>
             </a:r>
             <a:r>
               <a:rPr lang="cs-CZ" sz="2600" dirty="0" smtClean="0">
@@ -14547,7 +14528,6 @@
               <a:rPr lang="en-US" dirty="0" smtClean="0"/>
               <a:t>Compose tasks to run in parallel</a:t>
             </a:r>
-            <a:endParaRPr lang="en-US" dirty="0" smtClean="0"/>
           </a:p>
           <a:p>
             <a:r>
@@ -14650,7 +14630,6 @@
               <a:rPr lang="en-US" dirty="0" smtClean="0"/>
               <a:t>Run in parallel and wait for completion</a:t>
             </a:r>
-            <a:endParaRPr lang="en-US" dirty="0" smtClean="0"/>
           </a:p>
           <a:p>
             <a:endParaRPr lang="en-US" dirty="0" smtClean="0"/>
@@ -14674,7 +14653,6 @@
               <a:rPr lang="en-US" dirty="0" smtClean="0"/>
               <a:t>Works nicely with F# sequences and LINQ</a:t>
             </a:r>
-            <a:endParaRPr lang="en-US" dirty="0" smtClean="0"/>
           </a:p>
         </p:txBody>
       </p:sp>
@@ -15214,11 +15192,7 @@
           <a:p>
             <a:r>
               <a:rPr lang="en-US" dirty="0" smtClean="0"/>
-              <a:t>Start </a:t>
-            </a:r>
-            <a:r>
-              <a:rPr lang="en-US" dirty="0" smtClean="0"/>
-              <a:t>task and wait for completion later</a:t>
+              <a:t>Start task and wait for completion later</a:t>
             </a:r>
           </a:p>
           <a:p>
@@ -15282,7 +15256,6 @@
               <a:rPr lang="en-US" dirty="0" smtClean="0"/>
               <a:t> member</a:t>
             </a:r>
-            <a:endParaRPr lang="en-US" dirty="0" smtClean="0"/>
           </a:p>
           <a:p>
             <a:endParaRPr lang="en-US" dirty="0"/>
@@ -15297,7 +15270,7 @@
         </p:nvSpPr>
         <p:spPr>
           <a:xfrm>
-            <a:off x="1244602" y="2315059"/>
+            <a:off x="1244602" y="2302359"/>
             <a:ext cx="6845298" cy="1326105"/>
           </a:xfrm>
           <a:prstGeom prst="rect">
@@ -16042,11 +16015,7 @@
           <a:p>
             <a:r>
               <a:rPr lang="en-US" dirty="0" smtClean="0"/>
-              <a:t>Asyn</a:t>
-            </a:r>
-            <a:r>
-              <a:rPr lang="en-US" dirty="0" smtClean="0"/>
-              <a:t>c GUI programming</a:t>
+              <a:t>Async GUI programming</a:t>
             </a:r>
             <a:endParaRPr lang="cs-CZ" dirty="0"/>
           </a:p>
@@ -16218,7 +16187,7 @@
           <a:graphicData uri="http://schemas.openxmlformats.org/presentationml/2006/ole">
             <mc:AlternateContent xmlns:mc="http://schemas.openxmlformats.org/markup-compatibility/2006">
               <mc:Choice xmlns:v="urn:schemas-microsoft-com:vml" Requires="v">
-                <p:oleObj spid="_x0000_s1064" name="Visio" r:id="rId4" imgW="2101950" imgH="459626" progId="Visio.Drawing.11">
+                <p:oleObj spid="_x0000_s1066" name="Visio" r:id="rId4" imgW="2101950" imgH="459626" progId="Visio.Drawing.11">
                   <p:embed/>
                 </p:oleObj>
               </mc:Choice>
@@ -16533,7 +16502,6 @@
               <a:rPr lang="en-US" dirty="0" smtClean="0"/>
               <a:t>Key idea – asynchronous waiting</a:t>
             </a:r>
-            <a:endParaRPr lang="en-US" dirty="0" smtClean="0"/>
           </a:p>
           <a:p>
             <a:pPr lvl="1"/>
@@ -17045,12 +17013,6 @@
               </a:rPr>
               <a:t>) }</a:t>
             </a:r>
-            <a:endParaRPr lang="cs-CZ" dirty="0">
-              <a:solidFill>
-                <a:prstClr val="black"/>
-              </a:solidFill>
-              <a:latin typeface="Consolas"/>
-            </a:endParaRPr>
           </a:p>
         </p:txBody>
       </p:sp>
@@ -17305,7 +17267,6 @@
               <a:rPr lang="en-US" dirty="0" smtClean="0"/>
               <a:t>Can be written in C#, but wait for Rx Framework</a:t>
             </a:r>
-            <a:endParaRPr lang="en-US" dirty="0" smtClean="0"/>
           </a:p>
           <a:p>
             <a:pPr lvl="1"/>
@@ -17328,7 +17289,6 @@
               <a:rPr lang="en-US" dirty="0" smtClean="0"/>
               <a:t>Access GUI elements from GUI thread only</a:t>
             </a:r>
-            <a:endParaRPr lang="en-US" dirty="0" smtClean="0"/>
           </a:p>
           <a:p>
             <a:pPr lvl="1"/>
@@ -17577,11 +17537,7 @@
           <a:p>
             <a:r>
               <a:rPr lang="en-US" dirty="0" smtClean="0"/>
-              <a:t>Wrote </a:t>
-            </a:r>
-            <a:r>
-              <a:rPr lang="en-US" dirty="0" smtClean="0"/>
-              <a:t>book about F#</a:t>
+              <a:t>Wrote book about F#</a:t>
             </a:r>
           </a:p>
           <a:p>
@@ -17620,7 +17576,6 @@
               <a:rPr lang="en-US" dirty="0" smtClean="0"/>
               <a:t> </a:t>
             </a:r>
-            <a:endParaRPr lang="en-US" dirty="0" smtClean="0"/>
           </a:p>
         </p:txBody>
       </p:sp>
@@ -17908,11 +17863,7 @@
           <a:p>
             <a:r>
               <a:rPr lang="en-US" dirty="0" smtClean="0"/>
-              <a:t>Program consists of </a:t>
-            </a:r>
-            <a:r>
-              <a:rPr lang="en-US" dirty="0" smtClean="0"/>
-              <a:t>agents</a:t>
+              <a:t>Program consists of agents</a:t>
             </a:r>
           </a:p>
           <a:p>
@@ -17941,7 +17892,6 @@
               <a:rPr lang="en-US" dirty="0" smtClean="0"/>
               <a:t>workflows</a:t>
             </a:r>
-            <a:endParaRPr lang="en-US" dirty="0" smtClean="0"/>
           </a:p>
           <a:p>
             <a:r>
@@ -17969,11 +17919,7 @@
             <a:pPr lvl="1"/>
             <a:r>
               <a:rPr lang="en-US" dirty="0" smtClean="0"/>
-              <a:t>Messages are</a:t>
-            </a:r>
-            <a:r>
-              <a:rPr lang="en-US" dirty="0" smtClean="0"/>
-              <a:t> </a:t>
+              <a:t>Messages are </a:t>
             </a:r>
             <a:r>
               <a:rPr lang="en-US" b="1" dirty="0" smtClean="0"/>
@@ -17999,13 +17945,8 @@
             </a:r>
             <a:r>
               <a:rPr lang="en-US" b="1" dirty="0" smtClean="0"/>
-              <a:t>multiple </a:t>
-            </a:r>
-            <a:r>
-              <a:rPr lang="en-US" b="1" dirty="0" smtClean="0"/>
-              <a:t>instances</a:t>
-            </a:r>
-            <a:endParaRPr lang="en-US" b="1" dirty="0" smtClean="0"/>
+              <a:t>multiple instances</a:t>
+            </a:r>
           </a:p>
         </p:txBody>
       </p:sp>
@@ -18091,15 +18032,7 @@
           <a:p>
             <a:r>
               <a:rPr lang="en-US" dirty="0" smtClean="0"/>
-              <a:t>Send </a:t>
-            </a:r>
-            <a:r>
-              <a:rPr lang="en-US" dirty="0" smtClean="0"/>
-              <a:t>“Hello” </a:t>
-            </a:r>
-            <a:r>
-              <a:rPr lang="en-US" dirty="0" smtClean="0"/>
-              <a:t>to the caller</a:t>
+              <a:t>Send “Hello” to the caller</a:t>
             </a:r>
           </a:p>
           <a:p>
@@ -25186,7 +25119,6 @@
               <a:rPr lang="en-US" dirty="0" smtClean="0"/>
               <a:t>Computation expressions are more general</a:t>
             </a:r>
-            <a:endParaRPr lang="en-US" dirty="0" smtClean="0"/>
           </a:p>
         </p:txBody>
       </p:sp>

</xml_diff>